<commit_message>
edit docs and code
</commit_message>
<xml_diff>
--- a/documents/DataAnalytics_A6_Sebastian_CastilloSanchez_poster.pptx
+++ b/documents/DataAnalytics_A6_Sebastian_CastilloSanchez_poster.pptx
@@ -4404,22 +4404,8 @@
                   <a:latin typeface="Arial" panose="020B0604020202020204" pitchFamily="34" charset="0"/>
                   <a:cs typeface="Arial" panose="020B0604020202020204" pitchFamily="34" charset="0"/>
                 </a:rPr>
-                <a:t>As 80% of the world is covered by water, the resources that the oceans provide comes in large quantities. However, due to exploitation of these key resources and global warming, these resources are diminishing rapidly. Coral reef bleaching is one of many resulting effects and it could have a long-lasting impact to the oceans. Marine life rely on these coral reefs for food, general ecosystems, etc. . In turn, many people around the world rely on marine life and coral reefs for food, jobs, etc. Therefore, it should be important to analyze the effects of coral reef bleaching on areas such as aquaculture production and biodiversity. As the UN has specified “Life Under Water” as one of their Sustainability Goals for the next few years, there is starting to be more insight into what is happening around the world. </a:t>
+                <a:t>As 80% of the world is covered by water, the resources that the oceans provide comes in large quantities. However, due to the exploitation of these key resources and global warming, these resources are diminishing rapidly. Coral reef bleaching is one of many effects and it could have a long-lasting impact on the oceans. Marine life relies on these coral reefs for food, general ecosystems, etc. . In turn, many people around the world rely on marine life and coral reefs for food, jobs, etc. Therefore, it should be important to analyze the effects of coral reef bleaching on areas such as aquaculture production and biodiversity. As the UN has specified “Life Under Water” as one of their Sustainability Goals for the next few years, there is starting to be more insight into what is happening around the world. </a:t>
               </a:r>
-            </a:p>
-            <a:p>
-              <a:pPr algn="just">
-                <a:spcBef>
-                  <a:spcPts val="0"/>
-                </a:spcBef>
-                <a:spcAft>
-                  <a:spcPts val="0"/>
-                </a:spcAft>
-              </a:pPr>
-              <a:endParaRPr lang="en-US" sz="3200" dirty="0">
-                <a:latin typeface="Arial" panose="020B0604020202020204" pitchFamily="34" charset="0"/>
-                <a:cs typeface="Arial" panose="020B0604020202020204" pitchFamily="34" charset="0"/>
-              </a:endParaRPr>
             </a:p>
             <a:p>
               <a:pPr algn="just">
@@ -4435,7 +4421,7 @@
                   <a:latin typeface="Arial" panose="020B0604020202020204" pitchFamily="34" charset="0"/>
                   <a:cs typeface="Arial" panose="020B0604020202020204" pitchFamily="34" charset="0"/>
                 </a:rPr>
-                <a:t>This poster will give an overview of the problem being looked at and its approaches. A brief introduction about the data sources used as well as how the datasets were used alongside each other. Next, explanatory data analysis (EDA) will be shown to explain the data in a more visual way with plots and graphs. Then, the process of modeling, optimization and tuning will be shown to further analyze. </a:t>
+                <a:t>This poster will give an overview of the problem being looked at and its approaches. A brief introduction about the data sources used as well as how the datasets were used alongside each other. Next, explanatory data analysis (EDA) will be shown to explain the data more visually with plots and graphs. Then, the process of modeling, optimization, and tuning will be shown to further analyze. </a:t>
               </a:r>
             </a:p>
           </p:txBody>
@@ -6592,9 +6578,9 @@
         <p:grpSpPr>
           <a:xfrm>
             <a:off x="26621449" y="4402200"/>
-            <a:ext cx="10954405" cy="27050376"/>
+            <a:ext cx="10954405" cy="26619489"/>
             <a:chOff x="576544" y="12808367"/>
-            <a:chExt cx="12297395" cy="51137527"/>
+            <a:chExt cx="12297395" cy="50322957"/>
           </a:xfrm>
         </p:grpSpPr>
         <p:sp>
@@ -6612,7 +6598,7 @@
           <p:spPr>
             <a:xfrm>
               <a:off x="651849" y="14082392"/>
-              <a:ext cx="12222090" cy="49863502"/>
+              <a:ext cx="12222090" cy="49048932"/>
             </a:xfrm>
             <a:prstGeom prst="rect">
               <a:avLst/>
@@ -6637,76 +6623,68 @@
                   <a:latin typeface="Arial" panose="020B0604020202020204" pitchFamily="34" charset="0"/>
                   <a:cs typeface="Arial" panose="020B0604020202020204" pitchFamily="34" charset="0"/>
                 </a:rPr>
-                <a:t>Since all the variables in the full dataset that we wanted to focus on were mostly numeric as well as continuous, regression analysis was the best method to create models for this data. To find the best results for the data, three different regression models were developed. Then after performing regression and analyzing the results, a clustering analysis was performed using the data. For the following regression models, a train-test split was created for the numeric only data. The split created using the sample function had a 70-30 percentage split for the train and test data. This was done to train the models on the training data while testing it after with the test data while creating predictions. The three different regression models created were:</a:t>
+                <a:t>Since all the variables in the full dataset that we wanted to focus on were mostly numeric as well as continuous, regression analysis was the best method to create models for this data. To find the best results for the data, three different regression models were developed. Then after performing regression and analyzing the results, a clustering analysis was performed using the data. For the following regression models, a train-test split was created for the numeric-only data. The split created using the sample function had a 70-30 percentage split for the train and test data. This was done to train the models on the training data while testing it after with the test data while creating predictions. The three different regression models created were:</a:t>
               </a:r>
             </a:p>
             <a:p>
-              <a:pPr marL="457200" indent="-457200" algn="just">
-                <a:spcBef>
-                  <a:spcPts val="0"/>
-                </a:spcBef>
-                <a:spcAft>
-                  <a:spcPts val="0"/>
-                </a:spcAft>
-                <a:buFont typeface="Arial" panose="020B0604020202020204" pitchFamily="34" charset="0"/>
-                <a:buChar char="•"/>
+              <a:pPr algn="just">
+                <a:spcBef>
+                  <a:spcPts val="0"/>
+                </a:spcBef>
+                <a:spcAft>
+                  <a:spcPts val="0"/>
+                </a:spcAft>
               </a:pPr>
               <a:r>
                 <a:rPr lang="en-US" sz="2800" dirty="0">
                   <a:latin typeface="Arial" panose="020B0604020202020204" pitchFamily="34" charset="0"/>
                   <a:cs typeface="Arial" panose="020B0604020202020204" pitchFamily="34" charset="0"/>
                 </a:rPr>
-                <a:t>Linear Regression</a:t>
+                <a:t>•Linear Regression</a:t>
               </a:r>
             </a:p>
             <a:p>
-              <a:pPr marL="457200" indent="-457200" algn="just">
-                <a:spcBef>
-                  <a:spcPts val="0"/>
-                </a:spcBef>
-                <a:spcAft>
-                  <a:spcPts val="0"/>
-                </a:spcAft>
-                <a:buFont typeface="Arial" panose="020B0604020202020204" pitchFamily="34" charset="0"/>
-                <a:buChar char="•"/>
+              <a:pPr algn="just">
+                <a:spcBef>
+                  <a:spcPts val="0"/>
+                </a:spcBef>
+                <a:spcAft>
+                  <a:spcPts val="0"/>
+                </a:spcAft>
               </a:pPr>
               <a:r>
                 <a:rPr lang="en-US" sz="2800" dirty="0">
                   <a:latin typeface="Arial" panose="020B0604020202020204" pitchFamily="34" charset="0"/>
                   <a:cs typeface="Arial" panose="020B0604020202020204" pitchFamily="34" charset="0"/>
                 </a:rPr>
-                <a:t>Decision Tree</a:t>
+                <a:t>•Decision Tree</a:t>
               </a:r>
             </a:p>
             <a:p>
-              <a:pPr marL="457200" indent="-457200" algn="just">
-                <a:spcBef>
-                  <a:spcPts val="0"/>
-                </a:spcBef>
-                <a:spcAft>
-                  <a:spcPts val="0"/>
-                </a:spcAft>
-                <a:buFont typeface="Arial" panose="020B0604020202020204" pitchFamily="34" charset="0"/>
-                <a:buChar char="•"/>
+              <a:pPr algn="just">
+                <a:spcBef>
+                  <a:spcPts val="0"/>
+                </a:spcBef>
+                <a:spcAft>
+                  <a:spcPts val="0"/>
+                </a:spcAft>
               </a:pPr>
               <a:r>
                 <a:rPr lang="en-US" sz="2800" dirty="0">
                   <a:latin typeface="Arial" panose="020B0604020202020204" pitchFamily="34" charset="0"/>
                   <a:cs typeface="Arial" panose="020B0604020202020204" pitchFamily="34" charset="0"/>
                 </a:rPr>
-                <a:t>SVM Regression</a:t>
+                <a:t>•SVM Regression</a:t>
               </a:r>
             </a:p>
             <a:p>
-              <a:pPr marL="457200" indent="-457200" algn="just">
-                <a:spcBef>
-                  <a:spcPts val="0"/>
-                </a:spcBef>
-                <a:spcAft>
-                  <a:spcPts val="0"/>
-                </a:spcAft>
-                <a:buFont typeface="Arial" panose="020B0604020202020204" pitchFamily="34" charset="0"/>
-                <a:buChar char="•"/>
+              <a:pPr algn="just">
+                <a:spcBef>
+                  <a:spcPts val="0"/>
+                </a:spcBef>
+                <a:spcAft>
+                  <a:spcPts val="0"/>
+                </a:spcAft>
               </a:pPr>
               <a:endParaRPr lang="en-US" sz="2800" dirty="0">
                 <a:latin typeface="Arial" panose="020B0604020202020204" pitchFamily="34" charset="0"/>
@@ -6755,19 +6733,17 @@
                   <a:latin typeface="Arial" panose="020B0604020202020204" pitchFamily="34" charset="0"/>
                   <a:cs typeface="Arial" panose="020B0604020202020204" pitchFamily="34" charset="0"/>
                 </a:rPr>
-                <a:t> function. This cross-validation consisted of a 10-fold cross-validation that repeated 3 times. Results from the regression models showed low significance between bleaching with aquaculture production and KBA coverage but high significance with other climate and environmental related variables.</a:t>
+                <a:t> function. This cross-validation consisted of 10-fold cross-validation that repeated 3 times. Results from the regression models showed low significance between bleaching with aquaculture production and KBA coverage but high significance with other climate and environmental-related variables.</a:t>
               </a:r>
             </a:p>
             <a:p>
-              <a:pPr marL="342900" indent="-342900" algn="just">
-                <a:spcBef>
-                  <a:spcPts val="0"/>
-                </a:spcBef>
-                <a:spcAft>
-                  <a:spcPts val="0"/>
-                </a:spcAft>
-                <a:buFont typeface="Arial" panose="020B0604020202020204" pitchFamily="34" charset="0"/>
-                <a:buChar char="•"/>
+              <a:pPr algn="just">
+                <a:spcBef>
+                  <a:spcPts val="0"/>
+                </a:spcBef>
+                <a:spcAft>
+                  <a:spcPts val="0"/>
+                </a:spcAft>
               </a:pPr>
               <a:endParaRPr lang="en-US" sz="2800" dirty="0">
                 <a:latin typeface="Arial" panose="020B0604020202020204" pitchFamily="34" charset="0"/>
@@ -6788,7 +6764,7 @@
                   <a:latin typeface="Arial" panose="020B0604020202020204" pitchFamily="34" charset="0"/>
                   <a:cs typeface="Arial" panose="020B0604020202020204" pitchFamily="34" charset="0"/>
                 </a:rPr>
-                <a:t>For all these regression models, predictions could be created using the training fits and it being tested on the testing set. For the train sets, each model was trained using 224 observations and the testing/predictions was done on 98 observations in the testing set. The predictions were done using the respective models as well as the predict function in R. Since this was a regression problem, the predictions are not done by accuracy but by plotting the actual values on the predicted values </a:t>
+                <a:t>For all these regression models, predictions could be created using the training fits and it is tested on the testing set. For the train sets, each model was trained using 224 observations and the testing/predictions were done on 98 observations in the testing set. The predictions were done using the respective models as well as the predict function in R. Since this was a regression problem, the predictions are not done by accuracy but by plotting the actual values on the predicted values </a:t>
               </a:r>
             </a:p>
             <a:p>
@@ -6973,22 +6949,8 @@
                   <a:latin typeface="Arial" panose="020B0604020202020204" pitchFamily="34" charset="0"/>
                   <a:cs typeface="Arial" panose="020B0604020202020204" pitchFamily="34" charset="0"/>
                 </a:rPr>
-                <a:t> which was 0-5, 5-20, 20-80 respectively. This visualization is very helpful in visualizing the how each of the variables affect each other. </a:t>
+                <a:t> which was 0-5, 5-20, 20-80 respectively. This visualization is very helpful in visualizing how each of the variables affects the other. </a:t>
               </a:r>
-            </a:p>
-            <a:p>
-              <a:pPr algn="just">
-                <a:spcBef>
-                  <a:spcPts val="0"/>
-                </a:spcBef>
-                <a:spcAft>
-                  <a:spcPts val="0"/>
-                </a:spcAft>
-              </a:pPr>
-              <a:endParaRPr lang="en-US" sz="2800" dirty="0">
-                <a:latin typeface="Arial" panose="020B0604020202020204" pitchFamily="34" charset="0"/>
-                <a:cs typeface="Arial" panose="020B0604020202020204" pitchFamily="34" charset="0"/>
-              </a:endParaRPr>
             </a:p>
             <a:p>
               <a:pPr algn="just">
@@ -7004,7 +6966,7 @@
                   <a:latin typeface="Arial" panose="020B0604020202020204" pitchFamily="34" charset="0"/>
                   <a:cs typeface="Arial" panose="020B0604020202020204" pitchFamily="34" charset="0"/>
                 </a:rPr>
-                <a:t>K-Means Clustering was also performed on the data. To find the optimal number of clusters, a plot finding the within sum of squares was created. The plot showed that 3 clusters could be the most optimal number of clusters. The K-Means Clustering was done using the </a:t>
+                <a:t>K-Means Clustering was also performed on the data. To find the optimal number of clusters, a plot finding within the sum of squares was created. The plot showed that 3 clusters could be the most optimal number of clusters. The K-Means Clustering was done using the </a:t>
               </a:r>
               <a:r>
                 <a:rPr lang="en-US" sz="2800" dirty="0" err="1">
@@ -7020,20 +6982,6 @@
                 </a:rPr>
                 <a:t> R function using normalized (scaled) data of the numeric data and 3 clusters. The data was then aggregated using the mean function and aggregated by the different clusters that were created. </a:t>
               </a:r>
-            </a:p>
-            <a:p>
-              <a:pPr algn="just">
-                <a:spcBef>
-                  <a:spcPts val="0"/>
-                </a:spcBef>
-                <a:spcAft>
-                  <a:spcPts val="0"/>
-                </a:spcAft>
-              </a:pPr>
-              <a:endParaRPr lang="en-US" sz="2800" dirty="0">
-                <a:latin typeface="Arial" panose="020B0604020202020204" pitchFamily="34" charset="0"/>
-                <a:cs typeface="Arial" panose="020B0604020202020204" pitchFamily="34" charset="0"/>
-              </a:endParaRPr>
             </a:p>
           </p:txBody>
         </p:sp>
@@ -7335,7 +7283,7 @@
                   <a:latin typeface="Arial" panose="020B0604020202020204" pitchFamily="34" charset="0"/>
                   <a:cs typeface="Arial" panose="020B0604020202020204" pitchFamily="34" charset="0"/>
                 </a:rPr>
-                <a:t>The problem that this project will dive deeper into is if marine coral bleaching present in different countries around the world affect the country’s aquaculture production as well as their respective Key Biological Areas. With climate change as well as global warming increasing largely every year, we can hypothesize that marine coral bleaching is affecting marine life. </a:t>
+                <a:t>The problem that this project will dive deeper into is if marine coral bleaching present in different countries around the world affects the country’s aquaculture production as well as their respective Key Biological Areas. With climate change, as well as global warming, increasing largely every year, we can hypothesize that marine coral bleaching is affecting marine life. </a:t>
               </a:r>
             </a:p>
           </p:txBody>
@@ -7664,10 +7612,10 @@
         </p:nvGrpSpPr>
         <p:grpSpPr>
           <a:xfrm>
-            <a:off x="26241338" y="31047543"/>
-            <a:ext cx="11672048" cy="5124674"/>
+            <a:off x="26241338" y="31047544"/>
+            <a:ext cx="11672048" cy="4262900"/>
             <a:chOff x="581843" y="12476875"/>
-            <a:chExt cx="12222091" cy="9332055"/>
+            <a:chExt cx="12222091" cy="7762760"/>
           </a:xfrm>
         </p:grpSpPr>
         <p:sp>
@@ -7685,7 +7633,7 @@
           <p:spPr>
             <a:xfrm>
               <a:off x="581844" y="14018501"/>
-              <a:ext cx="12222090" cy="7790429"/>
+              <a:ext cx="12222090" cy="6221134"/>
             </a:xfrm>
             <a:prstGeom prst="rect">
               <a:avLst/>
@@ -7710,15 +7658,12 @@
                   <a:latin typeface="Arial" panose="020B0604020202020204" pitchFamily="34" charset="0"/>
                   <a:cs typeface="Arial" panose="020B0604020202020204" pitchFamily="34" charset="0"/>
                 </a:rPr>
-                <a:t>This project was to see if there were any effects of marine coral bleaching on aquaculture production as well as coverage percentage of Key Biodiversity Areas (KBA). From looking at the results from analysis and several different types of models, the conclusion is that there is no clear impact of the average amount of coral bleaching in the countries that were in the dataset on these two areas. However, the results from analysis and modeling showed that different variables have an impact on the two key dependent variables. The variables came from the original coral bleaching dataset and were mostly SSTA variables which measures Sea Surface Temperature Anomalies or TSA variables that measured Thermal Stress Anomalies.</a:t>
+                <a:t>This project was to see if there were any effects of marine coral bleaching on aquaculture production as well as coverage percentage of Key Biodiversity Areas (KBA). From looking at the results from analysis and several different types of models, the conclusion is that there is no clear impact of the average amount of coral bleaching in the countries that were in the dataset on these two areas. However, the results from analysis and modeling showed that different variables have an impact on the two key dependent variables. The variables came from the original coral bleaching dataset and were mostly SSTA variables that measure Sea Surface Temperature Anomalies or TSA variables that measured Thermal Stress Anomalies. </a:t>
               </a:r>
-              <a:r>
-                <a:rPr lang="en-US" sz="3200" dirty="0">
-                  <a:latin typeface="Arial" panose="020B0604020202020204" pitchFamily="34" charset="0"/>
-                  <a:cs typeface="Arial" panose="020B0604020202020204" pitchFamily="34" charset="0"/>
-                </a:rPr>
-                <a:t> </a:t>
-              </a:r>
+              <a:endParaRPr lang="en-US" sz="3200" dirty="0">
+                <a:latin typeface="Arial" panose="020B0604020202020204" pitchFamily="34" charset="0"/>
+                <a:cs typeface="Arial" panose="020B0604020202020204" pitchFamily="34" charset="0"/>
+              </a:endParaRPr>
             </a:p>
           </p:txBody>
         </p:sp>

</xml_diff>